<commit_message>
problem with link between entitie
</commit_message>
<xml_diff>
--- a/Weekend/ResourcesChrono.pptx
+++ b/Weekend/ResourcesChrono.pptx
@@ -290,7 +290,7 @@
             <a:fld id="{E5DA2A9B-526D-4AF2-BDBD-07E3B1428BFC}" type="datetimeFigureOut">
               <a:rPr lang="fr-FR" smtClean="0"/>
               <a:pPr/>
-              <a:t>10/02/2013</a:t>
+              <a:t>14/02/2013</a:t>
             </a:fld>
             <a:endParaRPr lang="fr-FR"/>
           </a:p>
@@ -457,7 +457,7 @@
             <a:fld id="{E5DA2A9B-526D-4AF2-BDBD-07E3B1428BFC}" type="datetimeFigureOut">
               <a:rPr lang="fr-FR" smtClean="0"/>
               <a:pPr/>
-              <a:t>10/02/2013</a:t>
+              <a:t>14/02/2013</a:t>
             </a:fld>
             <a:endParaRPr lang="fr-FR"/>
           </a:p>
@@ -634,7 +634,7 @@
             <a:fld id="{E5DA2A9B-526D-4AF2-BDBD-07E3B1428BFC}" type="datetimeFigureOut">
               <a:rPr lang="fr-FR" smtClean="0"/>
               <a:pPr/>
-              <a:t>10/02/2013</a:t>
+              <a:t>14/02/2013</a:t>
             </a:fld>
             <a:endParaRPr lang="fr-FR"/>
           </a:p>
@@ -801,7 +801,7 @@
             <a:fld id="{E5DA2A9B-526D-4AF2-BDBD-07E3B1428BFC}" type="datetimeFigureOut">
               <a:rPr lang="fr-FR" smtClean="0"/>
               <a:pPr/>
-              <a:t>10/02/2013</a:t>
+              <a:t>14/02/2013</a:t>
             </a:fld>
             <a:endParaRPr lang="fr-FR"/>
           </a:p>
@@ -1044,7 +1044,7 @@
             <a:fld id="{E5DA2A9B-526D-4AF2-BDBD-07E3B1428BFC}" type="datetimeFigureOut">
               <a:rPr lang="fr-FR" smtClean="0"/>
               <a:pPr/>
-              <a:t>10/02/2013</a:t>
+              <a:t>14/02/2013</a:t>
             </a:fld>
             <a:endParaRPr lang="fr-FR"/>
           </a:p>
@@ -1329,7 +1329,7 @@
             <a:fld id="{E5DA2A9B-526D-4AF2-BDBD-07E3B1428BFC}" type="datetimeFigureOut">
               <a:rPr lang="fr-FR" smtClean="0"/>
               <a:pPr/>
-              <a:t>10/02/2013</a:t>
+              <a:t>14/02/2013</a:t>
             </a:fld>
             <a:endParaRPr lang="fr-FR"/>
           </a:p>
@@ -1748,7 +1748,7 @@
             <a:fld id="{E5DA2A9B-526D-4AF2-BDBD-07E3B1428BFC}" type="datetimeFigureOut">
               <a:rPr lang="fr-FR" smtClean="0"/>
               <a:pPr/>
-              <a:t>10/02/2013</a:t>
+              <a:t>14/02/2013</a:t>
             </a:fld>
             <a:endParaRPr lang="fr-FR"/>
           </a:p>
@@ -1863,7 +1863,7 @@
             <a:fld id="{E5DA2A9B-526D-4AF2-BDBD-07E3B1428BFC}" type="datetimeFigureOut">
               <a:rPr lang="fr-FR" smtClean="0"/>
               <a:pPr/>
-              <a:t>10/02/2013</a:t>
+              <a:t>14/02/2013</a:t>
             </a:fld>
             <a:endParaRPr lang="fr-FR"/>
           </a:p>
@@ -1955,7 +1955,7 @@
             <a:fld id="{E5DA2A9B-526D-4AF2-BDBD-07E3B1428BFC}" type="datetimeFigureOut">
               <a:rPr lang="fr-FR" smtClean="0"/>
               <a:pPr/>
-              <a:t>10/02/2013</a:t>
+              <a:t>14/02/2013</a:t>
             </a:fld>
             <a:endParaRPr lang="fr-FR"/>
           </a:p>
@@ -2229,7 +2229,7 @@
             <a:fld id="{E5DA2A9B-526D-4AF2-BDBD-07E3B1428BFC}" type="datetimeFigureOut">
               <a:rPr lang="fr-FR" smtClean="0"/>
               <a:pPr/>
-              <a:t>10/02/2013</a:t>
+              <a:t>14/02/2013</a:t>
             </a:fld>
             <a:endParaRPr lang="fr-FR"/>
           </a:p>
@@ -2479,7 +2479,7 @@
             <a:fld id="{E5DA2A9B-526D-4AF2-BDBD-07E3B1428BFC}" type="datetimeFigureOut">
               <a:rPr lang="fr-FR" smtClean="0"/>
               <a:pPr/>
-              <a:t>10/02/2013</a:t>
+              <a:t>14/02/2013</a:t>
             </a:fld>
             <a:endParaRPr lang="fr-FR"/>
           </a:p>
@@ -2692,7 +2692,7 @@
             <a:fld id="{E5DA2A9B-526D-4AF2-BDBD-07E3B1428BFC}" type="datetimeFigureOut">
               <a:rPr lang="fr-FR" smtClean="0"/>
               <a:pPr/>
-              <a:t>10/02/2013</a:t>
+              <a:t>14/02/2013</a:t>
             </a:fld>
             <a:endParaRPr lang="fr-FR"/>
           </a:p>
@@ -3065,17 +3065,170 @@
       </p:grpSpPr>
       <p:grpSp>
         <p:nvGrpSpPr>
+          <p:cNvPr id="21" name="Groupe 20"/>
+          <p:cNvGrpSpPr/>
+          <p:nvPr/>
+        </p:nvGrpSpPr>
+        <p:grpSpPr>
+          <a:xfrm rot="10800000">
+            <a:off x="5688584" y="2072024"/>
+            <a:ext cx="2542400" cy="2520280"/>
+            <a:chOff x="183896" y="1425848"/>
+            <a:chExt cx="2542400" cy="2520280"/>
+          </a:xfrm>
+          <a:scene3d>
+            <a:camera prst="orthographicFront">
+              <a:rot lat="0" lon="6300000" rev="0"/>
+            </a:camera>
+            <a:lightRig rig="balanced" dir="t"/>
+          </a:scene3d>
+        </p:grpSpPr>
+        <p:sp>
+          <p:nvSpPr>
+            <p:cNvPr id="22" name="Ellipse 21"/>
+            <p:cNvSpPr/>
+            <p:nvPr/>
+          </p:nvSpPr>
+          <p:spPr>
+            <a:xfrm>
+              <a:off x="183896" y="1474216"/>
+              <a:ext cx="2423160" cy="2377440"/>
+            </a:xfrm>
+            <a:prstGeom prst="ellipse">
+              <a:avLst/>
+            </a:prstGeom>
+            <a:gradFill flip="none" rotWithShape="1">
+              <a:gsLst>
+                <a:gs pos="0">
+                  <a:srgbClr val="92D050">
+                    <a:shade val="30000"/>
+                    <a:satMod val="115000"/>
+                  </a:srgbClr>
+                </a:gs>
+                <a:gs pos="50000">
+                  <a:srgbClr val="92D050">
+                    <a:shade val="67500"/>
+                    <a:satMod val="115000"/>
+                  </a:srgbClr>
+                </a:gs>
+                <a:gs pos="100000">
+                  <a:srgbClr val="92D050">
+                    <a:shade val="100000"/>
+                    <a:satMod val="115000"/>
+                  </a:srgbClr>
+                </a:gs>
+              </a:gsLst>
+              <a:lin ang="13500000" scaled="1"/>
+              <a:tileRect/>
+            </a:gradFill>
+            <a:ln>
+              <a:solidFill>
+                <a:srgbClr val="92D050"/>
+              </a:solidFill>
+            </a:ln>
+            <a:sp3d extrusionH="247650"/>
+          </p:spPr>
+          <p:style>
+            <a:lnRef idx="2">
+              <a:schemeClr val="accent1">
+                <a:shade val="50000"/>
+              </a:schemeClr>
+            </a:lnRef>
+            <a:fillRef idx="1">
+              <a:schemeClr val="accent1"/>
+            </a:fillRef>
+            <a:effectRef idx="0">
+              <a:schemeClr val="accent1"/>
+            </a:effectRef>
+            <a:fontRef idx="minor">
+              <a:schemeClr val="lt1"/>
+            </a:fontRef>
+          </p:style>
+          <p:txBody>
+            <a:bodyPr rtlCol="0" anchor="ctr"/>
+            <a:lstStyle/>
+            <a:p>
+              <a:pPr algn="ctr"/>
+              <a:endParaRPr lang="fr-FR"/>
+            </a:p>
+          </p:txBody>
+        </p:sp>
+        <p:sp>
+          <p:nvSpPr>
+            <p:cNvPr id="23" name="Ellipse 22"/>
+            <p:cNvSpPr/>
+            <p:nvPr/>
+          </p:nvSpPr>
+          <p:spPr>
+            <a:xfrm>
+              <a:off x="206016" y="1425848"/>
+              <a:ext cx="2520280" cy="2520280"/>
+            </a:xfrm>
+            <a:prstGeom prst="ellipse">
+              <a:avLst/>
+            </a:prstGeom>
+            <a:noFill/>
+            <a:ln w="174625">
+              <a:solidFill>
+                <a:srgbClr val="92D050"/>
+              </a:solidFill>
+            </a:ln>
+            <a:effectLst>
+              <a:glow rad="101600">
+                <a:schemeClr val="bg1">
+                  <a:alpha val="60000"/>
+                </a:schemeClr>
+              </a:glow>
+            </a:effectLst>
+            <a:sp3d extrusionH="247650" prstMaterial="matte">
+              <a:bevelT prst="relaxedInset"/>
+            </a:sp3d>
+          </p:spPr>
+          <p:style>
+            <a:lnRef idx="2">
+              <a:schemeClr val="accent1">
+                <a:shade val="50000"/>
+              </a:schemeClr>
+            </a:lnRef>
+            <a:fillRef idx="1">
+              <a:schemeClr val="accent1"/>
+            </a:fillRef>
+            <a:effectRef idx="0">
+              <a:schemeClr val="accent1"/>
+            </a:effectRef>
+            <a:fontRef idx="minor">
+              <a:schemeClr val="lt1"/>
+            </a:fontRef>
+          </p:style>
+          <p:txBody>
+            <a:bodyPr rtlCol="0" anchor="ctr"/>
+            <a:lstStyle/>
+            <a:p>
+              <a:pPr algn="ctr"/>
+              <a:endParaRPr lang="fr-FR"/>
+            </a:p>
+          </p:txBody>
+        </p:sp>
+      </p:grpSp>
+      <p:grpSp>
+        <p:nvGrpSpPr>
           <p:cNvPr id="36" name="Groupe 35"/>
           <p:cNvGrpSpPr/>
           <p:nvPr/>
         </p:nvGrpSpPr>
         <p:grpSpPr>
           <a:xfrm>
-            <a:off x="-151384" y="1407560"/>
+            <a:off x="4914392" y="2065928"/>
             <a:ext cx="2542400" cy="2520280"/>
             <a:chOff x="183896" y="1425848"/>
             <a:chExt cx="2542400" cy="2520280"/>
           </a:xfrm>
+          <a:scene3d>
+            <a:camera prst="orthographicFront">
+              <a:rot lat="0" lon="4500000" rev="0"/>
+            </a:camera>
+            <a:lightRig rig="balanced" dir="t"/>
+          </a:scene3d>
         </p:grpSpPr>
         <p:sp>
           <p:nvSpPr>
@@ -3120,6 +3273,7 @@
                 <a:srgbClr val="92D050"/>
               </a:solidFill>
             </a:ln>
+            <a:sp3d extrusionH="247650"/>
           </p:spPr>
           <p:style>
             <a:lnRef idx="2">
@@ -3173,11 +3327,7 @@
                 </a:schemeClr>
               </a:glow>
             </a:effectLst>
-            <a:scene3d>
-              <a:camera prst="obliqueTopRight"/>
-              <a:lightRig rig="threePt" dir="t"/>
-            </a:scene3d>
-            <a:sp3d prstMaterial="matte">
+            <a:sp3d extrusionH="247650" prstMaterial="matte">
               <a:bevelT prst="relaxedInset"/>
             </a:sp3d>
           </p:spPr>
@@ -3862,6 +4012,455 @@
           </p:txBody>
         </p:sp>
       </p:grpSp>
+      <p:sp>
+        <p:nvSpPr>
+          <p:cNvPr id="24" name="Hexagone 23"/>
+          <p:cNvSpPr/>
+          <p:nvPr/>
+        </p:nvSpPr>
+        <p:spPr>
+          <a:xfrm>
+            <a:off x="1530096" y="2023872"/>
+            <a:ext cx="1469136" cy="1554480"/>
+          </a:xfrm>
+          <a:prstGeom prst="hexagon">
+            <a:avLst/>
+          </a:prstGeom>
+        </p:spPr>
+        <p:style>
+          <a:lnRef idx="2">
+            <a:schemeClr val="accent1">
+              <a:shade val="50000"/>
+            </a:schemeClr>
+          </a:lnRef>
+          <a:fillRef idx="1">
+            <a:schemeClr val="accent1"/>
+          </a:fillRef>
+          <a:effectRef idx="0">
+            <a:schemeClr val="accent1"/>
+          </a:effectRef>
+          <a:fontRef idx="minor">
+            <a:schemeClr val="lt1"/>
+          </a:fontRef>
+        </p:style>
+        <p:txBody>
+          <a:bodyPr rtlCol="0" anchor="ctr"/>
+          <a:lstStyle/>
+          <a:p>
+            <a:pPr algn="ctr"/>
+            <a:endParaRPr lang="fr-FR"/>
+          </a:p>
+        </p:txBody>
+      </p:sp>
+      <p:sp>
+        <p:nvSpPr>
+          <p:cNvPr id="25" name="Nuage 24"/>
+          <p:cNvSpPr/>
+          <p:nvPr/>
+        </p:nvSpPr>
+        <p:spPr>
+          <a:xfrm>
+            <a:off x="3669792" y="2775243"/>
+            <a:ext cx="981456" cy="760437"/>
+          </a:xfrm>
+          <a:prstGeom prst="cloud">
+            <a:avLst/>
+          </a:prstGeom>
+          <a:solidFill>
+            <a:schemeClr val="accent1"/>
+          </a:solidFill>
+          <a:scene3d>
+            <a:camera prst="orthographicFront">
+              <a:rot lat="0" lon="3000000" rev="0"/>
+            </a:camera>
+            <a:lightRig rig="flood" dir="t">
+              <a:rot lat="0" lon="0" rev="21594000"/>
+            </a:lightRig>
+          </a:scene3d>
+          <a:sp3d extrusionH="234950" prstMaterial="metal">
+            <a:bevelT prst="slope"/>
+            <a:bevelB prst="relaxedInset"/>
+          </a:sp3d>
+        </p:spPr>
+        <p:style>
+          <a:lnRef idx="1">
+            <a:schemeClr val="accent1"/>
+          </a:lnRef>
+          <a:fillRef idx="0">
+            <a:schemeClr val="accent1"/>
+          </a:fillRef>
+          <a:effectRef idx="0">
+            <a:schemeClr val="accent1"/>
+          </a:effectRef>
+          <a:fontRef idx="minor">
+            <a:schemeClr val="tx1"/>
+          </a:fontRef>
+        </p:style>
+        <p:txBody>
+          <a:bodyPr rtlCol="0" anchor="ctr"/>
+          <a:lstStyle/>
+          <a:p>
+            <a:pPr algn="ctr"/>
+            <a:endParaRPr lang="fr-FR"/>
+          </a:p>
+        </p:txBody>
+      </p:sp>
+      <p:sp>
+        <p:nvSpPr>
+          <p:cNvPr id="26" name="Ellipse 25"/>
+          <p:cNvSpPr/>
+          <p:nvPr/>
+        </p:nvSpPr>
+        <p:spPr>
+          <a:xfrm>
+            <a:off x="3968496" y="4748784"/>
+            <a:ext cx="1438656" cy="1493520"/>
+          </a:xfrm>
+          <a:prstGeom prst="ellipse">
+            <a:avLst/>
+          </a:prstGeom>
+          <a:solidFill>
+            <a:schemeClr val="bg1">
+              <a:lumMod val="95000"/>
+            </a:schemeClr>
+          </a:solidFill>
+          <a:ln>
+            <a:solidFill>
+              <a:schemeClr val="bg1">
+                <a:lumMod val="85000"/>
+              </a:schemeClr>
+            </a:solidFill>
+          </a:ln>
+          <a:scene3d>
+            <a:camera prst="orthographicFront">
+              <a:rot lat="0" lon="5400000" rev="0"/>
+            </a:camera>
+            <a:lightRig rig="flood" dir="t"/>
+          </a:scene3d>
+          <a:sp3d extrusionH="520700"/>
+        </p:spPr>
+        <p:style>
+          <a:lnRef idx="2">
+            <a:schemeClr val="accent1">
+              <a:shade val="50000"/>
+            </a:schemeClr>
+          </a:lnRef>
+          <a:fillRef idx="1">
+            <a:schemeClr val="accent1"/>
+          </a:fillRef>
+          <a:effectRef idx="0">
+            <a:schemeClr val="accent1"/>
+          </a:effectRef>
+          <a:fontRef idx="minor">
+            <a:schemeClr val="lt1"/>
+          </a:fontRef>
+        </p:style>
+        <p:txBody>
+          <a:bodyPr rtlCol="0" anchor="ctr"/>
+          <a:lstStyle/>
+          <a:p>
+            <a:pPr algn="ctr"/>
+            <a:endParaRPr lang="fr-FR"/>
+          </a:p>
+        </p:txBody>
+      </p:sp>
+      <p:sp>
+        <p:nvSpPr>
+          <p:cNvPr id="27" name="Ellipse 26"/>
+          <p:cNvSpPr/>
+          <p:nvPr/>
+        </p:nvSpPr>
+        <p:spPr>
+          <a:xfrm>
+            <a:off x="4700016" y="4748784"/>
+            <a:ext cx="1438656" cy="1493520"/>
+          </a:xfrm>
+          <a:prstGeom prst="ellipse">
+            <a:avLst/>
+          </a:prstGeom>
+          <a:solidFill>
+            <a:schemeClr val="bg1">
+              <a:lumMod val="95000"/>
+            </a:schemeClr>
+          </a:solidFill>
+          <a:ln>
+            <a:solidFill>
+              <a:schemeClr val="bg1">
+                <a:lumMod val="85000"/>
+              </a:schemeClr>
+            </a:solidFill>
+          </a:ln>
+          <a:scene3d>
+            <a:camera prst="orthographicFront">
+              <a:rot lat="0" lon="5400000" rev="0"/>
+            </a:camera>
+            <a:lightRig rig="flood" dir="t"/>
+          </a:scene3d>
+          <a:sp3d extrusionH="520700"/>
+        </p:spPr>
+        <p:style>
+          <a:lnRef idx="2">
+            <a:schemeClr val="accent1">
+              <a:shade val="50000"/>
+            </a:schemeClr>
+          </a:lnRef>
+          <a:fillRef idx="1">
+            <a:schemeClr val="accent1"/>
+          </a:fillRef>
+          <a:effectRef idx="0">
+            <a:schemeClr val="accent1"/>
+          </a:effectRef>
+          <a:fontRef idx="minor">
+            <a:schemeClr val="lt1"/>
+          </a:fontRef>
+        </p:style>
+        <p:txBody>
+          <a:bodyPr rtlCol="0" anchor="ctr"/>
+          <a:lstStyle/>
+          <a:p>
+            <a:pPr algn="ctr"/>
+            <a:endParaRPr lang="fr-FR"/>
+          </a:p>
+        </p:txBody>
+      </p:sp>
+      <p:sp>
+        <p:nvSpPr>
+          <p:cNvPr id="28" name="Ellipse 27"/>
+          <p:cNvSpPr/>
+          <p:nvPr/>
+        </p:nvSpPr>
+        <p:spPr>
+          <a:xfrm>
+            <a:off x="5431536" y="4748784"/>
+            <a:ext cx="1438656" cy="1493520"/>
+          </a:xfrm>
+          <a:prstGeom prst="ellipse">
+            <a:avLst/>
+          </a:prstGeom>
+          <a:solidFill>
+            <a:schemeClr val="bg1">
+              <a:lumMod val="95000"/>
+            </a:schemeClr>
+          </a:solidFill>
+          <a:ln>
+            <a:solidFill>
+              <a:schemeClr val="bg1">
+                <a:lumMod val="85000"/>
+              </a:schemeClr>
+            </a:solidFill>
+          </a:ln>
+          <a:scene3d>
+            <a:camera prst="orthographicFront">
+              <a:rot lat="0" lon="5400000" rev="0"/>
+            </a:camera>
+            <a:lightRig rig="flood" dir="t"/>
+          </a:scene3d>
+          <a:sp3d extrusionH="520700"/>
+        </p:spPr>
+        <p:style>
+          <a:lnRef idx="2">
+            <a:schemeClr val="accent1">
+              <a:shade val="50000"/>
+            </a:schemeClr>
+          </a:lnRef>
+          <a:fillRef idx="1">
+            <a:schemeClr val="accent1"/>
+          </a:fillRef>
+          <a:effectRef idx="0">
+            <a:schemeClr val="accent1"/>
+          </a:effectRef>
+          <a:fontRef idx="minor">
+            <a:schemeClr val="lt1"/>
+          </a:fontRef>
+        </p:style>
+        <p:txBody>
+          <a:bodyPr rtlCol="0" anchor="ctr"/>
+          <a:lstStyle/>
+          <a:p>
+            <a:pPr algn="ctr"/>
+            <a:endParaRPr lang="fr-FR"/>
+          </a:p>
+        </p:txBody>
+      </p:sp>
+      <p:sp>
+        <p:nvSpPr>
+          <p:cNvPr id="29" name="Ellipse 28"/>
+          <p:cNvSpPr/>
+          <p:nvPr/>
+        </p:nvSpPr>
+        <p:spPr>
+          <a:xfrm>
+            <a:off x="1298448" y="4596384"/>
+            <a:ext cx="1438656" cy="1493520"/>
+          </a:xfrm>
+          <a:prstGeom prst="ellipse">
+            <a:avLst/>
+          </a:prstGeom>
+          <a:solidFill>
+            <a:schemeClr val="bg1">
+              <a:lumMod val="95000"/>
+            </a:schemeClr>
+          </a:solidFill>
+          <a:ln>
+            <a:solidFill>
+              <a:schemeClr val="bg1">
+                <a:lumMod val="85000"/>
+              </a:schemeClr>
+            </a:solidFill>
+          </a:ln>
+          <a:scene3d>
+            <a:camera prst="orthographicFront">
+              <a:rot lat="0" lon="5400000" rev="0"/>
+            </a:camera>
+            <a:lightRig rig="flood" dir="t">
+              <a:rot lat="0" lon="0" rev="21594000"/>
+            </a:lightRig>
+          </a:scene3d>
+          <a:sp3d extrusionH="520700"/>
+        </p:spPr>
+        <p:style>
+          <a:lnRef idx="2">
+            <a:schemeClr val="accent1">
+              <a:shade val="50000"/>
+            </a:schemeClr>
+          </a:lnRef>
+          <a:fillRef idx="1">
+            <a:schemeClr val="accent1"/>
+          </a:fillRef>
+          <a:effectRef idx="0">
+            <a:schemeClr val="accent1"/>
+          </a:effectRef>
+          <a:fontRef idx="minor">
+            <a:schemeClr val="lt1"/>
+          </a:fontRef>
+        </p:style>
+        <p:txBody>
+          <a:bodyPr rtlCol="0" anchor="ctr"/>
+          <a:lstStyle/>
+          <a:p>
+            <a:pPr algn="ctr"/>
+            <a:endParaRPr lang="fr-FR"/>
+          </a:p>
+        </p:txBody>
+      </p:sp>
+      <p:sp>
+        <p:nvSpPr>
+          <p:cNvPr id="30" name="Ellipse 29"/>
+          <p:cNvSpPr/>
+          <p:nvPr/>
+        </p:nvSpPr>
+        <p:spPr>
+          <a:xfrm>
+            <a:off x="1889760" y="4584192"/>
+            <a:ext cx="1438656" cy="1493520"/>
+          </a:xfrm>
+          <a:prstGeom prst="ellipse">
+            <a:avLst/>
+          </a:prstGeom>
+          <a:solidFill>
+            <a:schemeClr val="bg1">
+              <a:lumMod val="95000"/>
+            </a:schemeClr>
+          </a:solidFill>
+          <a:ln>
+            <a:solidFill>
+              <a:schemeClr val="bg1">
+                <a:lumMod val="85000"/>
+              </a:schemeClr>
+            </a:solidFill>
+          </a:ln>
+          <a:scene3d>
+            <a:camera prst="orthographicFront">
+              <a:rot lat="0" lon="5400000" rev="0"/>
+            </a:camera>
+            <a:lightRig rig="flood" dir="t"/>
+          </a:scene3d>
+          <a:sp3d extrusionH="520700"/>
+        </p:spPr>
+        <p:style>
+          <a:lnRef idx="2">
+            <a:schemeClr val="accent1">
+              <a:shade val="50000"/>
+            </a:schemeClr>
+          </a:lnRef>
+          <a:fillRef idx="1">
+            <a:schemeClr val="accent1"/>
+          </a:fillRef>
+          <a:effectRef idx="0">
+            <a:schemeClr val="accent1"/>
+          </a:effectRef>
+          <a:fontRef idx="minor">
+            <a:schemeClr val="lt1"/>
+          </a:fontRef>
+        </p:style>
+        <p:txBody>
+          <a:bodyPr rtlCol="0" anchor="ctr"/>
+          <a:lstStyle/>
+          <a:p>
+            <a:pPr algn="ctr"/>
+            <a:endParaRPr lang="fr-FR"/>
+          </a:p>
+        </p:txBody>
+      </p:sp>
+      <p:sp>
+        <p:nvSpPr>
+          <p:cNvPr id="31" name="Ellipse 30"/>
+          <p:cNvSpPr/>
+          <p:nvPr/>
+        </p:nvSpPr>
+        <p:spPr>
+          <a:xfrm>
+            <a:off x="2468880" y="4596384"/>
+            <a:ext cx="1438656" cy="1493520"/>
+          </a:xfrm>
+          <a:prstGeom prst="ellipse">
+            <a:avLst/>
+          </a:prstGeom>
+          <a:solidFill>
+            <a:schemeClr val="bg1">
+              <a:lumMod val="95000"/>
+            </a:schemeClr>
+          </a:solidFill>
+          <a:ln>
+            <a:solidFill>
+              <a:schemeClr val="bg1">
+                <a:lumMod val="85000"/>
+              </a:schemeClr>
+            </a:solidFill>
+          </a:ln>
+          <a:scene3d>
+            <a:camera prst="orthographicFront">
+              <a:rot lat="0" lon="5400000" rev="0"/>
+            </a:camera>
+            <a:lightRig rig="flood" dir="t"/>
+          </a:scene3d>
+          <a:sp3d extrusionH="520700"/>
+        </p:spPr>
+        <p:style>
+          <a:lnRef idx="2">
+            <a:schemeClr val="accent1">
+              <a:shade val="50000"/>
+            </a:schemeClr>
+          </a:lnRef>
+          <a:fillRef idx="1">
+            <a:schemeClr val="accent1"/>
+          </a:fillRef>
+          <a:effectRef idx="0">
+            <a:schemeClr val="accent1"/>
+          </a:effectRef>
+          <a:fontRef idx="minor">
+            <a:schemeClr val="lt1"/>
+          </a:fontRef>
+        </p:style>
+        <p:txBody>
+          <a:bodyPr rtlCol="0" anchor="ctr"/>
+          <a:lstStyle/>
+          <a:p>
+            <a:pPr algn="ctr"/>
+            <a:endParaRPr lang="fr-FR"/>
+          </a:p>
+        </p:txBody>
+      </p:sp>
     </p:spTree>
   </p:cSld>
   <p:clrMapOvr>

</xml_diff>

<commit_message>
Market roulet is up
</commit_message>
<xml_diff>
--- a/Weekend/ResourcesChrono.pptx
+++ b/Weekend/ResourcesChrono.pptx
@@ -290,7 +290,7 @@
             <a:fld id="{E5DA2A9B-526D-4AF2-BDBD-07E3B1428BFC}" type="datetimeFigureOut">
               <a:rPr lang="fr-FR" smtClean="0"/>
               <a:pPr/>
-              <a:t>14/02/2013</a:t>
+              <a:t>17/02/2013</a:t>
             </a:fld>
             <a:endParaRPr lang="fr-FR"/>
           </a:p>
@@ -457,7 +457,7 @@
             <a:fld id="{E5DA2A9B-526D-4AF2-BDBD-07E3B1428BFC}" type="datetimeFigureOut">
               <a:rPr lang="fr-FR" smtClean="0"/>
               <a:pPr/>
-              <a:t>14/02/2013</a:t>
+              <a:t>17/02/2013</a:t>
             </a:fld>
             <a:endParaRPr lang="fr-FR"/>
           </a:p>
@@ -634,7 +634,7 @@
             <a:fld id="{E5DA2A9B-526D-4AF2-BDBD-07E3B1428BFC}" type="datetimeFigureOut">
               <a:rPr lang="fr-FR" smtClean="0"/>
               <a:pPr/>
-              <a:t>14/02/2013</a:t>
+              <a:t>17/02/2013</a:t>
             </a:fld>
             <a:endParaRPr lang="fr-FR"/>
           </a:p>
@@ -801,7 +801,7 @@
             <a:fld id="{E5DA2A9B-526D-4AF2-BDBD-07E3B1428BFC}" type="datetimeFigureOut">
               <a:rPr lang="fr-FR" smtClean="0"/>
               <a:pPr/>
-              <a:t>14/02/2013</a:t>
+              <a:t>17/02/2013</a:t>
             </a:fld>
             <a:endParaRPr lang="fr-FR"/>
           </a:p>
@@ -1044,7 +1044,7 @@
             <a:fld id="{E5DA2A9B-526D-4AF2-BDBD-07E3B1428BFC}" type="datetimeFigureOut">
               <a:rPr lang="fr-FR" smtClean="0"/>
               <a:pPr/>
-              <a:t>14/02/2013</a:t>
+              <a:t>17/02/2013</a:t>
             </a:fld>
             <a:endParaRPr lang="fr-FR"/>
           </a:p>
@@ -1329,7 +1329,7 @@
             <a:fld id="{E5DA2A9B-526D-4AF2-BDBD-07E3B1428BFC}" type="datetimeFigureOut">
               <a:rPr lang="fr-FR" smtClean="0"/>
               <a:pPr/>
-              <a:t>14/02/2013</a:t>
+              <a:t>17/02/2013</a:t>
             </a:fld>
             <a:endParaRPr lang="fr-FR"/>
           </a:p>
@@ -1748,7 +1748,7 @@
             <a:fld id="{E5DA2A9B-526D-4AF2-BDBD-07E3B1428BFC}" type="datetimeFigureOut">
               <a:rPr lang="fr-FR" smtClean="0"/>
               <a:pPr/>
-              <a:t>14/02/2013</a:t>
+              <a:t>17/02/2013</a:t>
             </a:fld>
             <a:endParaRPr lang="fr-FR"/>
           </a:p>
@@ -1863,7 +1863,7 @@
             <a:fld id="{E5DA2A9B-526D-4AF2-BDBD-07E3B1428BFC}" type="datetimeFigureOut">
               <a:rPr lang="fr-FR" smtClean="0"/>
               <a:pPr/>
-              <a:t>14/02/2013</a:t>
+              <a:t>17/02/2013</a:t>
             </a:fld>
             <a:endParaRPr lang="fr-FR"/>
           </a:p>
@@ -1955,7 +1955,7 @@
             <a:fld id="{E5DA2A9B-526D-4AF2-BDBD-07E3B1428BFC}" type="datetimeFigureOut">
               <a:rPr lang="fr-FR" smtClean="0"/>
               <a:pPr/>
-              <a:t>14/02/2013</a:t>
+              <a:t>17/02/2013</a:t>
             </a:fld>
             <a:endParaRPr lang="fr-FR"/>
           </a:p>
@@ -2229,7 +2229,7 @@
             <a:fld id="{E5DA2A9B-526D-4AF2-BDBD-07E3B1428BFC}" type="datetimeFigureOut">
               <a:rPr lang="fr-FR" smtClean="0"/>
               <a:pPr/>
-              <a:t>14/02/2013</a:t>
+              <a:t>17/02/2013</a:t>
             </a:fld>
             <a:endParaRPr lang="fr-FR"/>
           </a:p>
@@ -2479,7 +2479,7 @@
             <a:fld id="{E5DA2A9B-526D-4AF2-BDBD-07E3B1428BFC}" type="datetimeFigureOut">
               <a:rPr lang="fr-FR" smtClean="0"/>
               <a:pPr/>
-              <a:t>14/02/2013</a:t>
+              <a:t>17/02/2013</a:t>
             </a:fld>
             <a:endParaRPr lang="fr-FR"/>
           </a:p>
@@ -2692,7 +2692,7 @@
             <a:fld id="{E5DA2A9B-526D-4AF2-BDBD-07E3B1428BFC}" type="datetimeFigureOut">
               <a:rPr lang="fr-FR" smtClean="0"/>
               <a:pPr/>
-              <a:t>14/02/2013</a:t>
+              <a:t>17/02/2013</a:t>
             </a:fld>
             <a:endParaRPr lang="fr-FR"/>
           </a:p>
@@ -4020,7 +4020,7 @@
         </p:nvSpPr>
         <p:spPr>
           <a:xfrm>
-            <a:off x="1530096" y="2023872"/>
+            <a:off x="759132" y="2140413"/>
             <a:ext cx="1469136" cy="1554480"/>
           </a:xfrm>
           <a:prstGeom prst="hexagon">
@@ -4060,7 +4060,7 @@
         </p:nvSpPr>
         <p:spPr>
           <a:xfrm>
-            <a:off x="3669792" y="2775243"/>
+            <a:off x="334921" y="1107807"/>
             <a:ext cx="981456" cy="760437"/>
           </a:xfrm>
           <a:prstGeom prst="cloud">
@@ -4461,6 +4461,35 @@
           </a:p>
         </p:txBody>
       </p:sp>
+      <p:pic>
+        <p:nvPicPr>
+          <p:cNvPr id="1026" name="Picture 2" descr="C:\DevTools\Git\windowsPhone\Weekend\Weekend\images\sun.png"/>
+          <p:cNvPicPr>
+            <a:picLocks noChangeAspect="1" noChangeArrowheads="1"/>
+          </p:cNvPicPr>
+          <p:nvPr/>
+        </p:nvPicPr>
+        <p:blipFill>
+          <a:blip r:embed="rId2" cstate="print">
+            <a:grayscl/>
+            <a:lum bright="20000"/>
+          </a:blip>
+          <a:srcRect/>
+          <a:stretch>
+            <a:fillRect/>
+          </a:stretch>
+        </p:blipFill>
+        <p:spPr bwMode="auto">
+          <a:xfrm>
+            <a:off x="3352053" y="2384612"/>
+            <a:ext cx="1816100" cy="1816100"/>
+          </a:xfrm>
+          <a:prstGeom prst="rect">
+            <a:avLst/>
+          </a:prstGeom>
+          <a:noFill/>
+        </p:spPr>
+      </p:pic>
     </p:spTree>
   </p:cSld>
   <p:clrMapOvr>

</xml_diff>